<commit_message>
Deploy website Thu Sep 15 13:00:28 PDT 2022
</commit_message>
<xml_diff>
--- a/assets/slides/fa22/06-Lists_HOFs.pptx
+++ b/assets/slides/fa22/06-Lists_HOFs.pptx
@@ -1130,7 +1130,7 @@
           </a:ln>
           <a:extLst>
             <a:ext uri="{909E8E84-426E-40dd-AFC4-6F175D3DCCD1}">
-              <a14:hiddenFill xmlns="" xmlns:a14="http://schemas.microsoft.com/office/drawing/2010/main">
+              <a14:hiddenFill xmlns:a14="http://schemas.microsoft.com/office/drawing/2010/main" xmlns="">
                 <a:noFill/>
               </a14:hiddenFill>
             </a:ext>
@@ -1171,14 +1171,14 @@
           </a:ln>
           <a:extLst>
             <a:ext uri="{909E8E84-426E-40dd-AFC4-6F175D3DCCD1}">
-              <a14:hiddenFill xmlns="" xmlns:a14="http://schemas.microsoft.com/office/drawing/2010/main">
+              <a14:hiddenFill xmlns:a14="http://schemas.microsoft.com/office/drawing/2010/main" xmlns="">
                 <a:solidFill>
                   <a:srgbClr val="FFFFFF"/>
                 </a:solidFill>
               </a14:hiddenFill>
             </a:ext>
             <a:ext uri="{91240B29-F687-4f45-9708-019B960494DF}">
-              <a14:hiddenLine xmlns="" xmlns:a14="http://schemas.microsoft.com/office/drawing/2010/main" w="9525">
+              <a14:hiddenLine xmlns:a14="http://schemas.microsoft.com/office/drawing/2010/main" xmlns="" w="9525">
                 <a:solidFill>
                   <a:srgbClr val="000000"/>
                 </a:solidFill>
@@ -1282,14 +1282,14 @@
           </a:ln>
           <a:extLst>
             <a:ext uri="{909E8E84-426E-40dd-AFC4-6F175D3DCCD1}">
-              <a14:hiddenFill xmlns="" xmlns:a14="http://schemas.microsoft.com/office/drawing/2010/main">
+              <a14:hiddenFill xmlns:a14="http://schemas.microsoft.com/office/drawing/2010/main" xmlns="">
                 <a:solidFill>
                   <a:srgbClr val="FFFFFF"/>
                 </a:solidFill>
               </a14:hiddenFill>
             </a:ext>
             <a:ext uri="{91240B29-F687-4f45-9708-019B960494DF}">
-              <a14:hiddenLine xmlns="" xmlns:a14="http://schemas.microsoft.com/office/drawing/2010/main" w="9525">
+              <a14:hiddenLine xmlns:a14="http://schemas.microsoft.com/office/drawing/2010/main" xmlns="" w="9525">
                 <a:solidFill>
                   <a:srgbClr val="000000"/>
                 </a:solidFill>
@@ -1299,7 +1299,7 @@
               </a14:hiddenLine>
             </a:ext>
             <a:ext uri="{FAA26D3D-D897-4be2-8F04-BA451C77F1D7}">
-              <ma14:placeholderFlag xmlns="" xmlns:ma14="http://schemas.microsoft.com/office/mac/drawingml/2011/main" val="1"/>
+              <ma14:placeholderFlag xmlns:ma14="http://schemas.microsoft.com/office/mac/drawingml/2011/main" xmlns="" val="1"/>
             </a:ext>
           </a:extLst>
         </p:spPr>
@@ -1637,14 +1637,14 @@
           </a:ln>
           <a:extLst>
             <a:ext uri="{909E8E84-426E-40dd-AFC4-6F175D3DCCD1}">
-              <a14:hiddenFill xmlns="" xmlns:a14="http://schemas.microsoft.com/office/drawing/2010/main">
+              <a14:hiddenFill xmlns:a14="http://schemas.microsoft.com/office/drawing/2010/main" xmlns="">
                 <a:solidFill>
                   <a:srgbClr val="FFFFFF"/>
                 </a:solidFill>
               </a14:hiddenFill>
             </a:ext>
             <a:ext uri="{91240B29-F687-4f45-9708-019B960494DF}">
-              <a14:hiddenLine xmlns="" xmlns:a14="http://schemas.microsoft.com/office/drawing/2010/main" w="9525">
+              <a14:hiddenLine xmlns:a14="http://schemas.microsoft.com/office/drawing/2010/main" xmlns="" w="9525">
                 <a:solidFill>
                   <a:srgbClr val="000000"/>
                 </a:solidFill>
@@ -1654,7 +1654,7 @@
               </a14:hiddenLine>
             </a:ext>
             <a:ext uri="{FAA26D3D-D897-4be2-8F04-BA451C77F1D7}">
-              <ma14:placeholderFlag xmlns="" xmlns:ma14="http://schemas.microsoft.com/office/mac/drawingml/2011/main" val="1"/>
+              <ma14:placeholderFlag xmlns:ma14="http://schemas.microsoft.com/office/mac/drawingml/2011/main" xmlns="" val="1"/>
             </a:ext>
           </a:extLst>
         </p:spPr>
@@ -4209,14 +4209,14 @@
           </a:ln>
           <a:extLst>
             <a:ext uri="{909E8E84-426E-40dd-AFC4-6F175D3DCCD1}">
-              <a14:hiddenFill xmlns="" xmlns:a14="http://schemas.microsoft.com/office/drawing/2010/main">
+              <a14:hiddenFill xmlns:a14="http://schemas.microsoft.com/office/drawing/2010/main" xmlns="">
                 <a:solidFill>
                   <a:srgbClr val="FFFFFF"/>
                 </a:solidFill>
               </a14:hiddenFill>
             </a:ext>
             <a:ext uri="{91240B29-F687-4f45-9708-019B960494DF}">
-              <a14:hiddenLine xmlns="" xmlns:a14="http://schemas.microsoft.com/office/drawing/2010/main" w="9525">
+              <a14:hiddenLine xmlns:a14="http://schemas.microsoft.com/office/drawing/2010/main" xmlns="" w="9525">
                 <a:solidFill>
                   <a:srgbClr val="000000"/>
                 </a:solidFill>
@@ -4226,7 +4226,7 @@
               </a14:hiddenLine>
             </a:ext>
             <a:ext uri="{FAA26D3D-D897-4be2-8F04-BA451C77F1D7}">
-              <ma14:placeholderFlag xmlns="" xmlns:ma14="http://schemas.microsoft.com/office/mac/drawingml/2011/main" val="1"/>
+              <ma14:placeholderFlag xmlns:ma14="http://schemas.microsoft.com/office/mac/drawingml/2011/main" xmlns="" val="1"/>
             </a:ext>
           </a:extLst>
         </p:spPr>
@@ -4270,14 +4270,14 @@
           </a:ln>
           <a:extLst>
             <a:ext uri="{909E8E84-426E-40dd-AFC4-6F175D3DCCD1}">
-              <a14:hiddenFill xmlns="" xmlns:a14="http://schemas.microsoft.com/office/drawing/2010/main">
+              <a14:hiddenFill xmlns:a14="http://schemas.microsoft.com/office/drawing/2010/main" xmlns="">
                 <a:solidFill>
                   <a:srgbClr val="FFFFFF"/>
                 </a:solidFill>
               </a14:hiddenFill>
             </a:ext>
             <a:ext uri="{91240B29-F687-4f45-9708-019B960494DF}">
-              <a14:hiddenLine xmlns="" xmlns:a14="http://schemas.microsoft.com/office/drawing/2010/main" w="9525">
+              <a14:hiddenLine xmlns:a14="http://schemas.microsoft.com/office/drawing/2010/main" xmlns="" w="9525">
                 <a:solidFill>
                   <a:srgbClr val="000000"/>
                 </a:solidFill>
@@ -4287,7 +4287,7 @@
               </a14:hiddenLine>
             </a:ext>
             <a:ext uri="{FAA26D3D-D897-4be2-8F04-BA451C77F1D7}">
-              <ma14:placeholderFlag xmlns="" xmlns:ma14="http://schemas.microsoft.com/office/mac/drawingml/2011/main" val="1"/>
+              <ma14:placeholderFlag xmlns:ma14="http://schemas.microsoft.com/office/mac/drawingml/2011/main" xmlns="" val="1"/>
             </a:ext>
           </a:extLst>
         </p:spPr>
@@ -4392,7 +4392,7 @@
           </a:ln>
           <a:extLst>
             <a:ext uri="{909E8E84-426E-40dd-AFC4-6F175D3DCCD1}">
-              <a14:hiddenFill xmlns="" xmlns:a14="http://schemas.microsoft.com/office/drawing/2010/main">
+              <a14:hiddenFill xmlns:a14="http://schemas.microsoft.com/office/drawing/2010/main" xmlns="">
                 <a:noFill/>
               </a14:hiddenFill>
             </a:ext>
@@ -4433,14 +4433,14 @@
           </a:ln>
           <a:extLst>
             <a:ext uri="{909E8E84-426E-40dd-AFC4-6F175D3DCCD1}">
-              <a14:hiddenFill xmlns="" xmlns:a14="http://schemas.microsoft.com/office/drawing/2010/main">
+              <a14:hiddenFill xmlns:a14="http://schemas.microsoft.com/office/drawing/2010/main" xmlns="">
                 <a:solidFill>
                   <a:srgbClr val="FFFFFF"/>
                 </a:solidFill>
               </a14:hiddenFill>
             </a:ext>
             <a:ext uri="{91240B29-F687-4f45-9708-019B960494DF}">
-              <a14:hiddenLine xmlns="" xmlns:a14="http://schemas.microsoft.com/office/drawing/2010/main" w="9525">
+              <a14:hiddenLine xmlns:a14="http://schemas.microsoft.com/office/drawing/2010/main" xmlns="" w="9525">
                 <a:solidFill>
                   <a:srgbClr val="000000"/>
                 </a:solidFill>
@@ -4480,14 +4480,14 @@
           </a:ln>
           <a:extLst>
             <a:ext uri="{909E8E84-426E-40dd-AFC4-6F175D3DCCD1}">
-              <a14:hiddenFill xmlns="" xmlns:a14="http://schemas.microsoft.com/office/drawing/2010/main">
+              <a14:hiddenFill xmlns:a14="http://schemas.microsoft.com/office/drawing/2010/main" xmlns="">
                 <a:solidFill>
                   <a:srgbClr val="FFFFFF"/>
                 </a:solidFill>
               </a14:hiddenFill>
             </a:ext>
             <a:ext uri="{91240B29-F687-4f45-9708-019B960494DF}">
-              <a14:hiddenLine xmlns="" xmlns:a14="http://schemas.microsoft.com/office/drawing/2010/main" w="9525">
+              <a14:hiddenLine xmlns:a14="http://schemas.microsoft.com/office/drawing/2010/main" xmlns="" w="9525">
                 <a:solidFill>
                   <a:srgbClr val="000000"/>
                 </a:solidFill>
@@ -4497,7 +4497,7 @@
               </a14:hiddenLine>
             </a:ext>
             <a:ext uri="{FAA26D3D-D897-4be2-8F04-BA451C77F1D7}">
-              <ma14:placeholderFlag xmlns="" xmlns:ma14="http://schemas.microsoft.com/office/mac/drawingml/2011/main" val="1"/>
+              <ma14:placeholderFlag xmlns:ma14="http://schemas.microsoft.com/office/mac/drawingml/2011/main" xmlns="" val="1"/>
             </a:ext>
           </a:extLst>
         </p:spPr>
@@ -15253,6 +15253,38 @@
           </a:p>
         </p:txBody>
       </p:sp>
+      <p:sp>
+        <p:nvSpPr>
+          <p:cNvPr id="3" name="TextBox 2">
+            <a:extLst>
+              <a:ext uri="{FF2B5EF4-FFF2-40B4-BE49-F238E27FC236}">
+                <a16:creationId xmlns:a16="http://schemas.microsoft.com/office/drawing/2014/main" id="{D3BCA08A-381B-8517-1BB0-B9D6DCE70D3A}"/>
+              </a:ext>
+            </a:extLst>
+          </p:cNvPr>
+          <p:cNvSpPr txBox="1"/>
+          <p:nvPr/>
+        </p:nvSpPr>
+        <p:spPr>
+          <a:xfrm>
+            <a:off x="8812924" y="5218386"/>
+            <a:ext cx="184731" cy="369332"/>
+          </a:xfrm>
+          <a:prstGeom prst="rect">
+            <a:avLst/>
+          </a:prstGeom>
+          <a:noFill/>
+        </p:spPr>
+        <p:txBody>
+          <a:bodyPr wrap="none" rtlCol="0">
+            <a:spAutoFit/>
+          </a:bodyPr>
+          <a:lstStyle/>
+          <a:p>
+            <a:endParaRPr lang="en-US"/>
+          </a:p>
+        </p:txBody>
+      </p:sp>
     </p:spTree>
   </p:cSld>
   <p:clrMapOvr>
@@ -16840,6 +16872,78 @@
           </a:graphicData>
         </a:graphic>
       </p:graphicFrame>
+      <p:pic>
+        <p:nvPicPr>
+          <p:cNvPr id="10" name="Picture 9" descr="Graphical user interface, text&#10;&#10;Description automatically generated">
+            <a:extLst>
+              <a:ext uri="{FF2B5EF4-FFF2-40B4-BE49-F238E27FC236}">
+                <a16:creationId xmlns:a16="http://schemas.microsoft.com/office/drawing/2014/main" id="{38DC11D1-C8EA-A920-6353-2D41ECEF91A9}"/>
+              </a:ext>
+            </a:extLst>
+          </p:cNvPr>
+          <p:cNvPicPr>
+            <a:picLocks noChangeAspect="1"/>
+          </p:cNvPicPr>
+          <p:nvPr/>
+        </p:nvPicPr>
+        <p:blipFill>
+          <a:blip r:embed="rId2">
+            <a:extLst>
+              <a:ext uri="{28A0092B-C50C-407E-A947-70E740481C1C}">
+                <a14:useLocalDpi xmlns:a14="http://schemas.microsoft.com/office/drawing/2010/main" val="0"/>
+              </a:ext>
+            </a:extLst>
+          </a:blip>
+          <a:stretch>
+            <a:fillRect/>
+          </a:stretch>
+        </p:blipFill>
+        <p:spPr>
+          <a:xfrm>
+            <a:off x="3517900" y="2222500"/>
+            <a:ext cx="5156200" cy="2413000"/>
+          </a:xfrm>
+          <a:prstGeom prst="rect">
+            <a:avLst/>
+          </a:prstGeom>
+        </p:spPr>
+      </p:pic>
+      <p:pic>
+        <p:nvPicPr>
+          <p:cNvPr id="12" name="Picture 11" descr="Graphical user interface, text&#10;&#10;Description automatically generated">
+            <a:extLst>
+              <a:ext uri="{FF2B5EF4-FFF2-40B4-BE49-F238E27FC236}">
+                <a16:creationId xmlns:a16="http://schemas.microsoft.com/office/drawing/2014/main" id="{6D05D47C-49EC-5EE7-443C-7C34186160E6}"/>
+              </a:ext>
+            </a:extLst>
+          </p:cNvPr>
+          <p:cNvPicPr>
+            <a:picLocks noChangeAspect="1"/>
+          </p:cNvPicPr>
+          <p:nvPr/>
+        </p:nvPicPr>
+        <p:blipFill>
+          <a:blip r:embed="rId2">
+            <a:extLst>
+              <a:ext uri="{28A0092B-C50C-407E-A947-70E740481C1C}">
+                <a14:useLocalDpi xmlns:a14="http://schemas.microsoft.com/office/drawing/2010/main" val="0"/>
+              </a:ext>
+            </a:extLst>
+          </a:blip>
+          <a:stretch>
+            <a:fillRect/>
+          </a:stretch>
+        </p:blipFill>
+        <p:spPr>
+          <a:xfrm>
+            <a:off x="3670300" y="2374900"/>
+            <a:ext cx="5156200" cy="2413000"/>
+          </a:xfrm>
+          <a:prstGeom prst="rect">
+            <a:avLst/>
+          </a:prstGeom>
+        </p:spPr>
+      </p:pic>
     </p:spTree>
     <p:extLst>
       <p:ext uri="{BB962C8B-B14F-4D97-AF65-F5344CB8AC3E}">

</xml_diff>

<commit_message>
Deploy website Thu Sep 15 14:28:11 PDT 2022
</commit_message>
<xml_diff>
--- a/assets/slides/fa22/06-Lists_HOFs.pptx
+++ b/assets/slides/fa22/06-Lists_HOFs.pptx
@@ -1130,7 +1130,7 @@
           </a:ln>
           <a:extLst>
             <a:ext uri="{909E8E84-426E-40dd-AFC4-6F175D3DCCD1}">
-              <a14:hiddenFill xmlns:a14="http://schemas.microsoft.com/office/drawing/2010/main" xmlns="">
+              <a14:hiddenFill xmlns="" xmlns:a14="http://schemas.microsoft.com/office/drawing/2010/main">
                 <a:noFill/>
               </a14:hiddenFill>
             </a:ext>
@@ -1171,14 +1171,14 @@
           </a:ln>
           <a:extLst>
             <a:ext uri="{909E8E84-426E-40dd-AFC4-6F175D3DCCD1}">
-              <a14:hiddenFill xmlns:a14="http://schemas.microsoft.com/office/drawing/2010/main" xmlns="">
+              <a14:hiddenFill xmlns="" xmlns:a14="http://schemas.microsoft.com/office/drawing/2010/main">
                 <a:solidFill>
                   <a:srgbClr val="FFFFFF"/>
                 </a:solidFill>
               </a14:hiddenFill>
             </a:ext>
             <a:ext uri="{91240B29-F687-4f45-9708-019B960494DF}">
-              <a14:hiddenLine xmlns:a14="http://schemas.microsoft.com/office/drawing/2010/main" xmlns="" w="9525">
+              <a14:hiddenLine xmlns="" xmlns:a14="http://schemas.microsoft.com/office/drawing/2010/main" w="9525">
                 <a:solidFill>
                   <a:srgbClr val="000000"/>
                 </a:solidFill>
@@ -1282,14 +1282,14 @@
           </a:ln>
           <a:extLst>
             <a:ext uri="{909E8E84-426E-40dd-AFC4-6F175D3DCCD1}">
-              <a14:hiddenFill xmlns:a14="http://schemas.microsoft.com/office/drawing/2010/main" xmlns="">
+              <a14:hiddenFill xmlns="" xmlns:a14="http://schemas.microsoft.com/office/drawing/2010/main">
                 <a:solidFill>
                   <a:srgbClr val="FFFFFF"/>
                 </a:solidFill>
               </a14:hiddenFill>
             </a:ext>
             <a:ext uri="{91240B29-F687-4f45-9708-019B960494DF}">
-              <a14:hiddenLine xmlns:a14="http://schemas.microsoft.com/office/drawing/2010/main" xmlns="" w="9525">
+              <a14:hiddenLine xmlns="" xmlns:a14="http://schemas.microsoft.com/office/drawing/2010/main" w="9525">
                 <a:solidFill>
                   <a:srgbClr val="000000"/>
                 </a:solidFill>
@@ -1299,7 +1299,7 @@
               </a14:hiddenLine>
             </a:ext>
             <a:ext uri="{FAA26D3D-D897-4be2-8F04-BA451C77F1D7}">
-              <ma14:placeholderFlag xmlns:ma14="http://schemas.microsoft.com/office/mac/drawingml/2011/main" xmlns="" val="1"/>
+              <ma14:placeholderFlag xmlns="" xmlns:ma14="http://schemas.microsoft.com/office/mac/drawingml/2011/main" val="1"/>
             </a:ext>
           </a:extLst>
         </p:spPr>
@@ -1637,14 +1637,14 @@
           </a:ln>
           <a:extLst>
             <a:ext uri="{909E8E84-426E-40dd-AFC4-6F175D3DCCD1}">
-              <a14:hiddenFill xmlns:a14="http://schemas.microsoft.com/office/drawing/2010/main" xmlns="">
+              <a14:hiddenFill xmlns="" xmlns:a14="http://schemas.microsoft.com/office/drawing/2010/main">
                 <a:solidFill>
                   <a:srgbClr val="FFFFFF"/>
                 </a:solidFill>
               </a14:hiddenFill>
             </a:ext>
             <a:ext uri="{91240B29-F687-4f45-9708-019B960494DF}">
-              <a14:hiddenLine xmlns:a14="http://schemas.microsoft.com/office/drawing/2010/main" xmlns="" w="9525">
+              <a14:hiddenLine xmlns="" xmlns:a14="http://schemas.microsoft.com/office/drawing/2010/main" w="9525">
                 <a:solidFill>
                   <a:srgbClr val="000000"/>
                 </a:solidFill>
@@ -1654,7 +1654,7 @@
               </a14:hiddenLine>
             </a:ext>
             <a:ext uri="{FAA26D3D-D897-4be2-8F04-BA451C77F1D7}">
-              <ma14:placeholderFlag xmlns:ma14="http://schemas.microsoft.com/office/mac/drawingml/2011/main" xmlns="" val="1"/>
+              <ma14:placeholderFlag xmlns="" xmlns:ma14="http://schemas.microsoft.com/office/mac/drawingml/2011/main" val="1"/>
             </a:ext>
           </a:extLst>
         </p:spPr>
@@ -4209,14 +4209,14 @@
           </a:ln>
           <a:extLst>
             <a:ext uri="{909E8E84-426E-40dd-AFC4-6F175D3DCCD1}">
-              <a14:hiddenFill xmlns:a14="http://schemas.microsoft.com/office/drawing/2010/main" xmlns="">
+              <a14:hiddenFill xmlns="" xmlns:a14="http://schemas.microsoft.com/office/drawing/2010/main">
                 <a:solidFill>
                   <a:srgbClr val="FFFFFF"/>
                 </a:solidFill>
               </a14:hiddenFill>
             </a:ext>
             <a:ext uri="{91240B29-F687-4f45-9708-019B960494DF}">
-              <a14:hiddenLine xmlns:a14="http://schemas.microsoft.com/office/drawing/2010/main" xmlns="" w="9525">
+              <a14:hiddenLine xmlns="" xmlns:a14="http://schemas.microsoft.com/office/drawing/2010/main" w="9525">
                 <a:solidFill>
                   <a:srgbClr val="000000"/>
                 </a:solidFill>
@@ -4226,7 +4226,7 @@
               </a14:hiddenLine>
             </a:ext>
             <a:ext uri="{FAA26D3D-D897-4be2-8F04-BA451C77F1D7}">
-              <ma14:placeholderFlag xmlns:ma14="http://schemas.microsoft.com/office/mac/drawingml/2011/main" xmlns="" val="1"/>
+              <ma14:placeholderFlag xmlns="" xmlns:ma14="http://schemas.microsoft.com/office/mac/drawingml/2011/main" val="1"/>
             </a:ext>
           </a:extLst>
         </p:spPr>
@@ -4270,14 +4270,14 @@
           </a:ln>
           <a:extLst>
             <a:ext uri="{909E8E84-426E-40dd-AFC4-6F175D3DCCD1}">
-              <a14:hiddenFill xmlns:a14="http://schemas.microsoft.com/office/drawing/2010/main" xmlns="">
+              <a14:hiddenFill xmlns="" xmlns:a14="http://schemas.microsoft.com/office/drawing/2010/main">
                 <a:solidFill>
                   <a:srgbClr val="FFFFFF"/>
                 </a:solidFill>
               </a14:hiddenFill>
             </a:ext>
             <a:ext uri="{91240B29-F687-4f45-9708-019B960494DF}">
-              <a14:hiddenLine xmlns:a14="http://schemas.microsoft.com/office/drawing/2010/main" xmlns="" w="9525">
+              <a14:hiddenLine xmlns="" xmlns:a14="http://schemas.microsoft.com/office/drawing/2010/main" w="9525">
                 <a:solidFill>
                   <a:srgbClr val="000000"/>
                 </a:solidFill>
@@ -4287,7 +4287,7 @@
               </a14:hiddenLine>
             </a:ext>
             <a:ext uri="{FAA26D3D-D897-4be2-8F04-BA451C77F1D7}">
-              <ma14:placeholderFlag xmlns:ma14="http://schemas.microsoft.com/office/mac/drawingml/2011/main" xmlns="" val="1"/>
+              <ma14:placeholderFlag xmlns="" xmlns:ma14="http://schemas.microsoft.com/office/mac/drawingml/2011/main" val="1"/>
             </a:ext>
           </a:extLst>
         </p:spPr>
@@ -4392,7 +4392,7 @@
           </a:ln>
           <a:extLst>
             <a:ext uri="{909E8E84-426E-40dd-AFC4-6F175D3DCCD1}">
-              <a14:hiddenFill xmlns:a14="http://schemas.microsoft.com/office/drawing/2010/main" xmlns="">
+              <a14:hiddenFill xmlns="" xmlns:a14="http://schemas.microsoft.com/office/drawing/2010/main">
                 <a:noFill/>
               </a14:hiddenFill>
             </a:ext>
@@ -4433,14 +4433,14 @@
           </a:ln>
           <a:extLst>
             <a:ext uri="{909E8E84-426E-40dd-AFC4-6F175D3DCCD1}">
-              <a14:hiddenFill xmlns:a14="http://schemas.microsoft.com/office/drawing/2010/main" xmlns="">
+              <a14:hiddenFill xmlns="" xmlns:a14="http://schemas.microsoft.com/office/drawing/2010/main">
                 <a:solidFill>
                   <a:srgbClr val="FFFFFF"/>
                 </a:solidFill>
               </a14:hiddenFill>
             </a:ext>
             <a:ext uri="{91240B29-F687-4f45-9708-019B960494DF}">
-              <a14:hiddenLine xmlns:a14="http://schemas.microsoft.com/office/drawing/2010/main" xmlns="" w="9525">
+              <a14:hiddenLine xmlns="" xmlns:a14="http://schemas.microsoft.com/office/drawing/2010/main" w="9525">
                 <a:solidFill>
                   <a:srgbClr val="000000"/>
                 </a:solidFill>
@@ -4480,14 +4480,14 @@
           </a:ln>
           <a:extLst>
             <a:ext uri="{909E8E84-426E-40dd-AFC4-6F175D3DCCD1}">
-              <a14:hiddenFill xmlns:a14="http://schemas.microsoft.com/office/drawing/2010/main" xmlns="">
+              <a14:hiddenFill xmlns="" xmlns:a14="http://schemas.microsoft.com/office/drawing/2010/main">
                 <a:solidFill>
                   <a:srgbClr val="FFFFFF"/>
                 </a:solidFill>
               </a14:hiddenFill>
             </a:ext>
             <a:ext uri="{91240B29-F687-4f45-9708-019B960494DF}">
-              <a14:hiddenLine xmlns:a14="http://schemas.microsoft.com/office/drawing/2010/main" xmlns="" w="9525">
+              <a14:hiddenLine xmlns="" xmlns:a14="http://schemas.microsoft.com/office/drawing/2010/main" w="9525">
                 <a:solidFill>
                   <a:srgbClr val="000000"/>
                 </a:solidFill>
@@ -4497,7 +4497,7 @@
               </a14:hiddenLine>
             </a:ext>
             <a:ext uri="{FAA26D3D-D897-4be2-8F04-BA451C77F1D7}">
-              <ma14:placeholderFlag xmlns:ma14="http://schemas.microsoft.com/office/mac/drawingml/2011/main" xmlns="" val="1"/>
+              <ma14:placeholderFlag xmlns="" xmlns:ma14="http://schemas.microsoft.com/office/mac/drawingml/2011/main" val="1"/>
             </a:ext>
           </a:extLst>
         </p:spPr>
@@ -16872,78 +16872,6 @@
           </a:graphicData>
         </a:graphic>
       </p:graphicFrame>
-      <p:pic>
-        <p:nvPicPr>
-          <p:cNvPr id="10" name="Picture 9" descr="Graphical user interface, text&#10;&#10;Description automatically generated">
-            <a:extLst>
-              <a:ext uri="{FF2B5EF4-FFF2-40B4-BE49-F238E27FC236}">
-                <a16:creationId xmlns:a16="http://schemas.microsoft.com/office/drawing/2014/main" id="{38DC11D1-C8EA-A920-6353-2D41ECEF91A9}"/>
-              </a:ext>
-            </a:extLst>
-          </p:cNvPr>
-          <p:cNvPicPr>
-            <a:picLocks noChangeAspect="1"/>
-          </p:cNvPicPr>
-          <p:nvPr/>
-        </p:nvPicPr>
-        <p:blipFill>
-          <a:blip r:embed="rId2">
-            <a:extLst>
-              <a:ext uri="{28A0092B-C50C-407E-A947-70E740481C1C}">
-                <a14:useLocalDpi xmlns:a14="http://schemas.microsoft.com/office/drawing/2010/main" val="0"/>
-              </a:ext>
-            </a:extLst>
-          </a:blip>
-          <a:stretch>
-            <a:fillRect/>
-          </a:stretch>
-        </p:blipFill>
-        <p:spPr>
-          <a:xfrm>
-            <a:off x="3517900" y="2222500"/>
-            <a:ext cx="5156200" cy="2413000"/>
-          </a:xfrm>
-          <a:prstGeom prst="rect">
-            <a:avLst/>
-          </a:prstGeom>
-        </p:spPr>
-      </p:pic>
-      <p:pic>
-        <p:nvPicPr>
-          <p:cNvPr id="12" name="Picture 11" descr="Graphical user interface, text&#10;&#10;Description automatically generated">
-            <a:extLst>
-              <a:ext uri="{FF2B5EF4-FFF2-40B4-BE49-F238E27FC236}">
-                <a16:creationId xmlns:a16="http://schemas.microsoft.com/office/drawing/2014/main" id="{6D05D47C-49EC-5EE7-443C-7C34186160E6}"/>
-              </a:ext>
-            </a:extLst>
-          </p:cNvPr>
-          <p:cNvPicPr>
-            <a:picLocks noChangeAspect="1"/>
-          </p:cNvPicPr>
-          <p:nvPr/>
-        </p:nvPicPr>
-        <p:blipFill>
-          <a:blip r:embed="rId2">
-            <a:extLst>
-              <a:ext uri="{28A0092B-C50C-407E-A947-70E740481C1C}">
-                <a14:useLocalDpi xmlns:a14="http://schemas.microsoft.com/office/drawing/2010/main" val="0"/>
-              </a:ext>
-            </a:extLst>
-          </a:blip>
-          <a:stretch>
-            <a:fillRect/>
-          </a:stretch>
-        </p:blipFill>
-        <p:spPr>
-          <a:xfrm>
-            <a:off x="3670300" y="2374900"/>
-            <a:ext cx="5156200" cy="2413000"/>
-          </a:xfrm>
-          <a:prstGeom prst="rect">
-            <a:avLst/>
-          </a:prstGeom>
-        </p:spPr>
-      </p:pic>
     </p:spTree>
     <p:extLst>
       <p:ext uri="{BB962C8B-B14F-4D97-AF65-F5344CB8AC3E}">

</xml_diff>